<commit_message>
wrote iMoMo observations formatter
</commit_message>
<xml_diff>
--- a/Layout-openDA_RRMDA_Themi.pptx
+++ b/Layout-openDA_RRMDA_Themi.pptx
@@ -212,7 +212,7 @@
           <a:p>
             <a:fld id="{796EC12A-D2D7-B342-A807-00A91177731C}" type="datetimeFigureOut">
               <a:rPr lang="en-US" smtClean="0"/>
-              <a:t>10/12/15</a:t>
+              <a:t>10/14/15</a:t>
             </a:fld>
             <a:endParaRPr lang="en-US"/>
           </a:p>
@@ -863,7 +863,7 @@
           <a:p>
             <a:fld id="{F3A4439B-FCAC-0540-BC1B-DAE173A0DB32}" type="datetimeFigureOut">
               <a:rPr lang="en-US" smtClean="0"/>
-              <a:t>10/12/15</a:t>
+              <a:t>10/14/15</a:t>
             </a:fld>
             <a:endParaRPr lang="en-US"/>
           </a:p>
@@ -1033,7 +1033,7 @@
           <a:p>
             <a:fld id="{F3A4439B-FCAC-0540-BC1B-DAE173A0DB32}" type="datetimeFigureOut">
               <a:rPr lang="en-US" smtClean="0"/>
-              <a:t>10/12/15</a:t>
+              <a:t>10/14/15</a:t>
             </a:fld>
             <a:endParaRPr lang="en-US"/>
           </a:p>
@@ -1213,7 +1213,7 @@
           <a:p>
             <a:fld id="{F3A4439B-FCAC-0540-BC1B-DAE173A0DB32}" type="datetimeFigureOut">
               <a:rPr lang="en-US" smtClean="0"/>
-              <a:t>10/12/15</a:t>
+              <a:t>10/14/15</a:t>
             </a:fld>
             <a:endParaRPr lang="en-US"/>
           </a:p>
@@ -1383,7 +1383,7 @@
           <a:p>
             <a:fld id="{F3A4439B-FCAC-0540-BC1B-DAE173A0DB32}" type="datetimeFigureOut">
               <a:rPr lang="en-US" smtClean="0"/>
-              <a:t>10/12/15</a:t>
+              <a:t>10/14/15</a:t>
             </a:fld>
             <a:endParaRPr lang="en-US"/>
           </a:p>
@@ -1627,7 +1627,7 @@
           <a:p>
             <a:fld id="{F3A4439B-FCAC-0540-BC1B-DAE173A0DB32}" type="datetimeFigureOut">
               <a:rPr lang="en-US" smtClean="0"/>
-              <a:t>10/12/15</a:t>
+              <a:t>10/14/15</a:t>
             </a:fld>
             <a:endParaRPr lang="en-US"/>
           </a:p>
@@ -1859,7 +1859,7 @@
           <a:p>
             <a:fld id="{F3A4439B-FCAC-0540-BC1B-DAE173A0DB32}" type="datetimeFigureOut">
               <a:rPr lang="en-US" smtClean="0"/>
-              <a:t>10/12/15</a:t>
+              <a:t>10/14/15</a:t>
             </a:fld>
             <a:endParaRPr lang="en-US"/>
           </a:p>
@@ -2226,7 +2226,7 @@
           <a:p>
             <a:fld id="{F3A4439B-FCAC-0540-BC1B-DAE173A0DB32}" type="datetimeFigureOut">
               <a:rPr lang="en-US" smtClean="0"/>
-              <a:t>10/12/15</a:t>
+              <a:t>10/14/15</a:t>
             </a:fld>
             <a:endParaRPr lang="en-US"/>
           </a:p>
@@ -2344,7 +2344,7 @@
           <a:p>
             <a:fld id="{F3A4439B-FCAC-0540-BC1B-DAE173A0DB32}" type="datetimeFigureOut">
               <a:rPr lang="en-US" smtClean="0"/>
-              <a:t>10/12/15</a:t>
+              <a:t>10/14/15</a:t>
             </a:fld>
             <a:endParaRPr lang="en-US"/>
           </a:p>
@@ -2439,7 +2439,7 @@
           <a:p>
             <a:fld id="{F3A4439B-FCAC-0540-BC1B-DAE173A0DB32}" type="datetimeFigureOut">
               <a:rPr lang="en-US" smtClean="0"/>
-              <a:t>10/12/15</a:t>
+              <a:t>10/14/15</a:t>
             </a:fld>
             <a:endParaRPr lang="en-US"/>
           </a:p>
@@ -2716,7 +2716,7 @@
           <a:p>
             <a:fld id="{F3A4439B-FCAC-0540-BC1B-DAE173A0DB32}" type="datetimeFigureOut">
               <a:rPr lang="en-US" smtClean="0"/>
-              <a:t>10/12/15</a:t>
+              <a:t>10/14/15</a:t>
             </a:fld>
             <a:endParaRPr lang="en-US"/>
           </a:p>
@@ -2973,7 +2973,7 @@
           <a:p>
             <a:fld id="{F3A4439B-FCAC-0540-BC1B-DAE173A0DB32}" type="datetimeFigureOut">
               <a:rPr lang="en-US" smtClean="0"/>
-              <a:t>10/12/15</a:t>
+              <a:t>10/14/15</a:t>
             </a:fld>
             <a:endParaRPr lang="en-US"/>
           </a:p>
@@ -3186,7 +3186,7 @@
           <a:p>
             <a:fld id="{F3A4439B-FCAC-0540-BC1B-DAE173A0DB32}" type="datetimeFigureOut">
               <a:rPr lang="en-US" smtClean="0"/>
-              <a:t>10/12/15</a:t>
+              <a:t>10/14/15</a:t>
             </a:fld>
             <a:endParaRPr lang="en-US"/>
           </a:p>
@@ -4709,11 +4709,17 @@
             </a:r>
             <a:r>
               <a:rPr lang="en-US" dirty="0" smtClean="0"/>
-              <a:t>. </a:t>
-            </a:r>
-            <a:r>
-              <a:rPr lang="en-US" smtClean="0"/>
-              <a:t>not implemented currently.</a:t>
+              <a:t>. not implemented currently</a:t>
+            </a:r>
+            <a:r>
+              <a:rPr lang="en-US" dirty="0" smtClean="0"/>
+              <a:t>.</a:t>
+            </a:r>
+          </a:p>
+          <a:p>
+            <a:r>
+              <a:rPr lang="en-US" dirty="0" smtClean="0"/>
+              <a:t>observation reader</a:t>
             </a:r>
             <a:endParaRPr lang="en-US" dirty="0" smtClean="0"/>
           </a:p>
@@ -4766,7 +4772,11 @@
           <a:p>
             <a:r>
               <a:rPr lang="en-US" dirty="0" smtClean="0"/>
-              <a:t>set up method</a:t>
+              <a:t>python set </a:t>
+            </a:r>
+            <a:r>
+              <a:rPr lang="en-US" dirty="0" smtClean="0"/>
+              <a:t>up method</a:t>
             </a:r>
             <a:endParaRPr lang="en-US" dirty="0"/>
           </a:p>
@@ -4787,6 +4797,37 @@
           <a:bodyPr/>
           <a:lstStyle/>
           <a:p>
+            <a:r>
+              <a:rPr lang="en-US" dirty="0" smtClean="0"/>
+              <a:t>Copy needed input files to input directory</a:t>
+            </a:r>
+            <a:endParaRPr lang="en-US" dirty="0"/>
+          </a:p>
+          <a:p>
+            <a:r>
+              <a:rPr lang="en-US" dirty="0" smtClean="0"/>
+              <a:t>Adapt </a:t>
+            </a:r>
+            <a:r>
+              <a:rPr lang="en-US" dirty="0" err="1" smtClean="0"/>
+              <a:t>restartInFile</a:t>
+            </a:r>
+            <a:r>
+              <a:rPr lang="en-US" dirty="0" smtClean="0"/>
+              <a:t> in </a:t>
+            </a:r>
+            <a:r>
+              <a:rPr lang="en-US" dirty="0" err="1"/>
+              <a:t>RRMDA.oda</a:t>
+            </a:r>
+            <a:r>
+              <a:rPr lang="en-US" dirty="0"/>
+              <a:t> file at each time step</a:t>
+            </a:r>
+            <a:r>
+              <a:rPr lang="en-US" dirty="0" smtClean="0"/>
+              <a:t>.</a:t>
+            </a:r>
             <a:endParaRPr lang="en-US" dirty="0"/>
           </a:p>
         </p:txBody>
@@ -4838,7 +4879,15 @@
           <a:p>
             <a:r>
               <a:rPr lang="en-US" dirty="0" smtClean="0"/>
-              <a:t>clean up method</a:t>
+              <a:t>clean up </a:t>
+            </a:r>
+            <a:r>
+              <a:rPr lang="en-US" dirty="0" smtClean="0"/>
+              <a:t>method, possibly call from within </a:t>
+            </a:r>
+            <a:r>
+              <a:rPr lang="en-US" dirty="0" err="1" smtClean="0"/>
+              <a:t>openDA</a:t>
             </a:r>
             <a:endParaRPr lang="en-US" dirty="0"/>
           </a:p>

</xml_diff>

<commit_message>
added wrapper for time stuff
added timeWrapper to read start and end time of the simulation as well
as simulation time step and adapted Ewrapper to read time but not write
it.
</commit_message>
<xml_diff>
--- a/Layout-openDA_RRMDA_Themi.pptx
+++ b/Layout-openDA_RRMDA_Themi.pptx
@@ -4827,6 +4827,24 @@
             <a:r>
               <a:rPr lang="en-US" dirty="0" smtClean="0"/>
               <a:t>.</a:t>
+            </a:r>
+          </a:p>
+          <a:p>
+            <a:r>
+              <a:rPr lang="en-US" dirty="0" smtClean="0"/>
+              <a:t>Copy observation file  (</a:t>
+            </a:r>
+            <a:r>
+              <a:rPr lang="en-US" dirty="0" err="1" smtClean="0"/>
+              <a:t>iMoMo</a:t>
+            </a:r>
+            <a:r>
+              <a:rPr lang="en-US" dirty="0" smtClean="0"/>
+              <a:t>) to observer and rewrite </a:t>
+            </a:r>
+            <a:r>
+              <a:rPr lang="en-US" smtClean="0"/>
+              <a:t>the configuration file. </a:t>
             </a:r>
             <a:endParaRPr lang="en-US" dirty="0"/>
           </a:p>

</xml_diff>

<commit_message>
updated wrappers and doc
</commit_message>
<xml_diff>
--- a/Layout-openDA_RRMDA_Themi.pptx
+++ b/Layout-openDA_RRMDA_Themi.pptx
@@ -212,7 +212,7 @@
           <a:p>
             <a:fld id="{796EC12A-D2D7-B342-A807-00A91177731C}" type="datetimeFigureOut">
               <a:rPr lang="en-US" smtClean="0"/>
-              <a:t>10/14/15</a:t>
+              <a:t>12/16/15</a:t>
             </a:fld>
             <a:endParaRPr lang="en-US"/>
           </a:p>
@@ -863,7 +863,7 @@
           <a:p>
             <a:fld id="{F3A4439B-FCAC-0540-BC1B-DAE173A0DB32}" type="datetimeFigureOut">
               <a:rPr lang="en-US" smtClean="0"/>
-              <a:t>10/14/15</a:t>
+              <a:t>12/16/15</a:t>
             </a:fld>
             <a:endParaRPr lang="en-US"/>
           </a:p>
@@ -1033,7 +1033,7 @@
           <a:p>
             <a:fld id="{F3A4439B-FCAC-0540-BC1B-DAE173A0DB32}" type="datetimeFigureOut">
               <a:rPr lang="en-US" smtClean="0"/>
-              <a:t>10/14/15</a:t>
+              <a:t>12/16/15</a:t>
             </a:fld>
             <a:endParaRPr lang="en-US"/>
           </a:p>
@@ -1213,7 +1213,7 @@
           <a:p>
             <a:fld id="{F3A4439B-FCAC-0540-BC1B-DAE173A0DB32}" type="datetimeFigureOut">
               <a:rPr lang="en-US" smtClean="0"/>
-              <a:t>10/14/15</a:t>
+              <a:t>12/16/15</a:t>
             </a:fld>
             <a:endParaRPr lang="en-US"/>
           </a:p>
@@ -1383,7 +1383,7 @@
           <a:p>
             <a:fld id="{F3A4439B-FCAC-0540-BC1B-DAE173A0DB32}" type="datetimeFigureOut">
               <a:rPr lang="en-US" smtClean="0"/>
-              <a:t>10/14/15</a:t>
+              <a:t>12/16/15</a:t>
             </a:fld>
             <a:endParaRPr lang="en-US"/>
           </a:p>
@@ -1627,7 +1627,7 @@
           <a:p>
             <a:fld id="{F3A4439B-FCAC-0540-BC1B-DAE173A0DB32}" type="datetimeFigureOut">
               <a:rPr lang="en-US" smtClean="0"/>
-              <a:t>10/14/15</a:t>
+              <a:t>12/16/15</a:t>
             </a:fld>
             <a:endParaRPr lang="en-US"/>
           </a:p>
@@ -1859,7 +1859,7 @@
           <a:p>
             <a:fld id="{F3A4439B-FCAC-0540-BC1B-DAE173A0DB32}" type="datetimeFigureOut">
               <a:rPr lang="en-US" smtClean="0"/>
-              <a:t>10/14/15</a:t>
+              <a:t>12/16/15</a:t>
             </a:fld>
             <a:endParaRPr lang="en-US"/>
           </a:p>
@@ -2226,7 +2226,7 @@
           <a:p>
             <a:fld id="{F3A4439B-FCAC-0540-BC1B-DAE173A0DB32}" type="datetimeFigureOut">
               <a:rPr lang="en-US" smtClean="0"/>
-              <a:t>10/14/15</a:t>
+              <a:t>12/16/15</a:t>
             </a:fld>
             <a:endParaRPr lang="en-US"/>
           </a:p>
@@ -2344,7 +2344,7 @@
           <a:p>
             <a:fld id="{F3A4439B-FCAC-0540-BC1B-DAE173A0DB32}" type="datetimeFigureOut">
               <a:rPr lang="en-US" smtClean="0"/>
-              <a:t>10/14/15</a:t>
+              <a:t>12/16/15</a:t>
             </a:fld>
             <a:endParaRPr lang="en-US"/>
           </a:p>
@@ -2439,7 +2439,7 @@
           <a:p>
             <a:fld id="{F3A4439B-FCAC-0540-BC1B-DAE173A0DB32}" type="datetimeFigureOut">
               <a:rPr lang="en-US" smtClean="0"/>
-              <a:t>10/14/15</a:t>
+              <a:t>12/16/15</a:t>
             </a:fld>
             <a:endParaRPr lang="en-US"/>
           </a:p>
@@ -2716,7 +2716,7 @@
           <a:p>
             <a:fld id="{F3A4439B-FCAC-0540-BC1B-DAE173A0DB32}" type="datetimeFigureOut">
               <a:rPr lang="en-US" smtClean="0"/>
-              <a:t>10/14/15</a:t>
+              <a:t>12/16/15</a:t>
             </a:fld>
             <a:endParaRPr lang="en-US"/>
           </a:p>
@@ -2973,7 +2973,7 @@
           <a:p>
             <a:fld id="{F3A4439B-FCAC-0540-BC1B-DAE173A0DB32}" type="datetimeFigureOut">
               <a:rPr lang="en-US" smtClean="0"/>
-              <a:t>10/14/15</a:t>
+              <a:t>12/16/15</a:t>
             </a:fld>
             <a:endParaRPr lang="en-US"/>
           </a:p>
@@ -3186,7 +3186,7 @@
           <a:p>
             <a:fld id="{F3A4439B-FCAC-0540-BC1B-DAE173A0DB32}" type="datetimeFigureOut">
               <a:rPr lang="en-US" smtClean="0"/>
-              <a:t>10/14/15</a:t>
+              <a:t>12/16/15</a:t>
             </a:fld>
             <a:endParaRPr lang="en-US"/>
           </a:p>
@@ -4401,7 +4401,7 @@
         <p:spPr>
           <a:xfrm>
             <a:off x="4512214" y="2077406"/>
-            <a:ext cx="4143633" cy="3231654"/>
+            <a:ext cx="4143633" cy="3416320"/>
           </a:xfrm>
           <a:prstGeom prst="rect">
             <a:avLst/>
@@ -4434,7 +4434,7 @@
             </a:pPr>
             <a:r>
               <a:rPr lang="en-US" sz="1200" dirty="0" smtClean="0"/>
-              <a:t>copy content of restart/</a:t>
+              <a:t>copy rainfall runoff model structure to input.</a:t>
             </a:r>
           </a:p>
           <a:p>
@@ -4444,7 +4444,7 @@
             </a:pPr>
             <a:r>
               <a:rPr lang="en-US" sz="1200" dirty="0" smtClean="0"/>
-              <a:t>data/processed/sub/*</a:t>
+              <a:t>generate observations </a:t>
             </a:r>
           </a:p>
           <a:p>
@@ -4454,7 +4454,17 @@
             </a:pPr>
             <a:r>
               <a:rPr lang="en-US" sz="1200" dirty="0" smtClean="0"/>
-              <a:t>Put it all to an </a:t>
+              <a:t>re-format observations</a:t>
+            </a:r>
+          </a:p>
+          <a:p>
+            <a:pPr marL="285750" indent="-285750">
+              <a:buFont typeface="Arial" charset="0"/>
+              <a:buChar char="•"/>
+            </a:pPr>
+            <a:r>
+              <a:rPr lang="en-US" sz="1200" dirty="0" smtClean="0"/>
+              <a:t>adapt time steps in </a:t>
             </a:r>
             <a:r>
               <a:rPr lang="en-US" sz="1200" dirty="0" err="1" smtClean="0"/>
@@ -4462,8 +4472,9 @@
             </a:r>
             <a:r>
               <a:rPr lang="en-US" sz="1200" dirty="0" smtClean="0"/>
-              <a:t> input directory</a:t>
-            </a:r>
+              <a:t> configuration files</a:t>
+            </a:r>
+            <a:endParaRPr lang="en-US" sz="1200" dirty="0" smtClean="0"/>
           </a:p>
           <a:p>
             <a:pPr marL="285750" indent="-285750">
@@ -4647,7 +4658,9 @@
         </p:nvSpPr>
         <p:spPr/>
         <p:txBody>
-          <a:bodyPr/>
+          <a:bodyPr>
+            <a:normAutofit lnSpcReduction="10000"/>
+          </a:bodyPr>
           <a:lstStyle/>
           <a:p>
             <a:pPr marL="0" indent="0">
@@ -4673,7 +4686,15 @@
             </a:r>
             <a:r>
               <a:rPr lang="en-US" dirty="0" smtClean="0"/>
-              <a:t>: read and write. must have.</a:t>
+              <a:t>: read and </a:t>
+            </a:r>
+            <a:r>
+              <a:rPr lang="en-US" dirty="0" smtClean="0"/>
+              <a:t>write of augmented state vector. </a:t>
+            </a:r>
+            <a:r>
+              <a:rPr lang="en-US" dirty="0" smtClean="0"/>
+              <a:t>must have.</a:t>
             </a:r>
           </a:p>
           <a:p>
@@ -4687,7 +4708,7 @@
             </a:r>
             <a:r>
               <a:rPr lang="en-US" dirty="0" smtClean="0"/>
-              <a:t>. initial states.</a:t>
+              <a:t>. initial states. Not implemented.</a:t>
             </a:r>
           </a:p>
           <a:p>
@@ -4709,17 +4730,27 @@
             </a:r>
             <a:r>
               <a:rPr lang="en-US" dirty="0" smtClean="0"/>
-              <a:t>. not implemented currently</a:t>
-            </a:r>
+              <a:t>. not implemented currently.</a:t>
+            </a:r>
+          </a:p>
+          <a:p>
             <a:r>
               <a:rPr lang="en-US" dirty="0" smtClean="0"/>
-              <a:t>.</a:t>
-            </a:r>
-          </a:p>
-          <a:p>
+              <a:t>observation reader (use </a:t>
+            </a:r>
+            <a:r>
+              <a:rPr lang="en-US" dirty="0" err="1" smtClean="0"/>
+              <a:t>noosTimeSeriesObserver</a:t>
+            </a:r>
             <a:r>
               <a:rPr lang="en-US" dirty="0" smtClean="0"/>
-              <a:t>observation reader</a:t>
+              <a:t>)</a:t>
+            </a:r>
+          </a:p>
+          <a:p>
+            <a:r>
+              <a:rPr lang="en-US" dirty="0" smtClean="0"/>
+              <a:t>time wrapper (modified RRMDA to write time steps)</a:t>
             </a:r>
             <a:endParaRPr lang="en-US" dirty="0" smtClean="0"/>
           </a:p>
@@ -4772,34 +4803,42 @@
           <a:p>
             <a:r>
               <a:rPr lang="en-US" dirty="0" smtClean="0"/>
-              <a:t>python set </a:t>
-            </a:r>
+              <a:t>python set up method</a:t>
+            </a:r>
+            <a:endParaRPr lang="en-US" dirty="0"/>
+          </a:p>
+        </p:txBody>
+      </p:sp>
+      <p:sp>
+        <p:nvSpPr>
+          <p:cNvPr id="3" name="Content Placeholder 2"/>
+          <p:cNvSpPr>
+            <a:spLocks noGrp="1"/>
+          </p:cNvSpPr>
+          <p:nvPr>
+            <p:ph idx="1"/>
+          </p:nvPr>
+        </p:nvSpPr>
+        <p:spPr/>
+        <p:txBody>
+          <a:bodyPr/>
+          <a:lstStyle/>
+          <a:p>
             <a:r>
               <a:rPr lang="en-US" dirty="0" smtClean="0"/>
-              <a:t>up method</a:t>
-            </a:r>
-            <a:endParaRPr lang="en-US" dirty="0"/>
-          </a:p>
-        </p:txBody>
-      </p:sp>
-      <p:sp>
-        <p:nvSpPr>
-          <p:cNvPr id="3" name="Content Placeholder 2"/>
-          <p:cNvSpPr>
-            <a:spLocks noGrp="1"/>
-          </p:cNvSpPr>
-          <p:nvPr>
-            <p:ph idx="1"/>
-          </p:nvPr>
-        </p:nvSpPr>
-        <p:spPr/>
-        <p:txBody>
-          <a:bodyPr/>
-          <a:lstStyle/>
-          <a:p>
+              <a:t>Copy </a:t>
+            </a:r>
             <a:r>
               <a:rPr lang="en-US" dirty="0" smtClean="0"/>
-              <a:t>Copy needed input files to input directory</a:t>
+              <a:t>model structure to </a:t>
+            </a:r>
+            <a:r>
+              <a:rPr lang="en-US" dirty="0" err="1" smtClean="0"/>
+              <a:t>openDA</a:t>
+            </a:r>
+            <a:r>
+              <a:rPr lang="en-US" dirty="0" smtClean="0"/>
+              <a:t> model input directory</a:t>
             </a:r>
             <a:endParaRPr lang="en-US" dirty="0"/>
           </a:p>
@@ -4814,7 +4853,11 @@
             </a:r>
             <a:r>
               <a:rPr lang="en-US" dirty="0" smtClean="0"/>
-              <a:t> in </a:t>
+              <a:t> </a:t>
+            </a:r>
+            <a:r>
+              <a:rPr lang="en-US" dirty="0" smtClean="0"/>
+              <a:t>and result file name in </a:t>
             </a:r>
             <a:r>
               <a:rPr lang="en-US" dirty="0" err="1"/>
@@ -4840,11 +4883,54 @@
             </a:r>
             <a:r>
               <a:rPr lang="en-US" dirty="0" smtClean="0"/>
-              <a:t>) to observer and rewrite </a:t>
-            </a:r>
-            <a:r>
-              <a:rPr lang="en-US" smtClean="0"/>
-              <a:t>the configuration file. </a:t>
+              <a:t>) to </a:t>
+            </a:r>
+            <a:r>
+              <a:rPr lang="en-US" dirty="0" smtClean="0"/>
+              <a:t>observer, reformat input, generate observations if needed, </a:t>
+            </a:r>
+            <a:r>
+              <a:rPr lang="en-US" dirty="0" smtClean="0"/>
+              <a:t>and rewrite the configuration file. </a:t>
+            </a:r>
+            <a:endParaRPr lang="en-US" dirty="0" smtClean="0"/>
+          </a:p>
+          <a:p>
+            <a:r>
+              <a:rPr lang="en-US" dirty="0" smtClean="0"/>
+              <a:t>Within </a:t>
+            </a:r>
+            <a:r>
+              <a:rPr lang="en-US" dirty="0" err="1" smtClean="0"/>
+              <a:t>openDA</a:t>
+            </a:r>
+            <a:r>
+              <a:rPr lang="en-US" dirty="0" smtClean="0"/>
+              <a:t> (</a:t>
+            </a:r>
+            <a:r>
+              <a:rPr lang="en-US" dirty="0" err="1" smtClean="0"/>
+              <a:t>matlab_batcher</a:t>
+            </a:r>
+            <a:r>
+              <a:rPr lang="en-US" dirty="0" smtClean="0"/>
+              <a:t>) adapt </a:t>
+            </a:r>
+            <a:r>
+              <a:rPr lang="en-US" dirty="0" err="1" smtClean="0"/>
+              <a:t>setup.mat</a:t>
+            </a:r>
+            <a:r>
+              <a:rPr lang="en-US" dirty="0" smtClean="0"/>
+              <a:t> for each </a:t>
+            </a:r>
+            <a:r>
+              <a:rPr lang="en-US" dirty="0" err="1" smtClean="0"/>
+              <a:t>openDA</a:t>
+            </a:r>
+            <a:r>
+              <a:rPr lang="en-US" dirty="0" smtClean="0"/>
+              <a:t> working directory.</a:t>
             </a:r>
             <a:endParaRPr lang="en-US" dirty="0"/>
           </a:p>
@@ -4897,11 +4983,7 @@
           <a:p>
             <a:r>
               <a:rPr lang="en-US" dirty="0" smtClean="0"/>
-              <a:t>clean up </a:t>
-            </a:r>
-            <a:r>
-              <a:rPr lang="en-US" dirty="0" smtClean="0"/>
-              <a:t>method, possibly call from within </a:t>
+              <a:t>clean up method, possibly call from within </a:t>
             </a:r>
             <a:r>
               <a:rPr lang="en-US" dirty="0" err="1" smtClean="0"/>
@@ -4932,11 +5014,15 @@
             </a:r>
             <a:r>
               <a:rPr lang="en-US" dirty="0" err="1" smtClean="0"/>
-              <a:t>E.mat</a:t>
+              <a:t>E_oda.mat</a:t>
             </a:r>
             <a:r>
               <a:rPr lang="en-US" dirty="0" smtClean="0"/>
-              <a:t> from all </a:t>
+              <a:t> </a:t>
+            </a:r>
+            <a:r>
+              <a:rPr lang="en-US" dirty="0" smtClean="0"/>
+              <a:t>from all </a:t>
             </a:r>
             <a:r>
               <a:rPr lang="en-US" dirty="0" err="1" smtClean="0"/>
@@ -4953,6 +5039,50 @@
             <a:r>
               <a:rPr lang="en-US" dirty="0" smtClean="0"/>
               <a:t>.</a:t>
+            </a:r>
+          </a:p>
+          <a:p>
+            <a:r>
+              <a:rPr lang="en-US" dirty="0" smtClean="0"/>
+              <a:t>Do the same for </a:t>
+            </a:r>
+          </a:p>
+          <a:p>
+            <a:pPr lvl="1"/>
+            <a:r>
+              <a:rPr lang="en-US" dirty="0" smtClean="0"/>
+              <a:t>results/</a:t>
+            </a:r>
+            <a:r>
+              <a:rPr lang="en-US" dirty="0" err="1" smtClean="0"/>
+              <a:t>nowcast</a:t>
+            </a:r>
+            <a:endParaRPr lang="en-US" dirty="0" smtClean="0"/>
+          </a:p>
+          <a:p>
+            <a:pPr lvl="1"/>
+            <a:r>
+              <a:rPr lang="en-US" dirty="0" smtClean="0"/>
+              <a:t>results/forecast/*</a:t>
+            </a:r>
+          </a:p>
+          <a:p>
+            <a:pPr lvl="1"/>
+            <a:r>
+              <a:rPr lang="en-US" dirty="0" smtClean="0"/>
+              <a:t>data/processed/</a:t>
+            </a:r>
+            <a:r>
+              <a:rPr lang="en-US" dirty="0" err="1" smtClean="0"/>
+              <a:t>db</a:t>
+            </a:r>
+            <a:endParaRPr lang="en-US" dirty="0" smtClean="0"/>
+          </a:p>
+          <a:p>
+            <a:pPr lvl="1"/>
+            <a:r>
+              <a:rPr lang="en-US" dirty="0" smtClean="0"/>
+              <a:t>data/processed/sub</a:t>
             </a:r>
             <a:endParaRPr lang="en-US" dirty="0"/>
           </a:p>

</xml_diff>